<commit_message>
added Augustos Narrations to powerpoint slide and set up slide timings
</commit_message>
<xml_diff>
--- a/Team Deliverable 3/Augustos Narrations.pptx
+++ b/Team Deliverable 3/Augustos Narrations.pptx
@@ -111,7 +111,7 @@
   </p:defaultTextStyle>
   <p:extLst>
     <p:ext uri="{EFAFB233-063F-42B5-8137-9DF3F51BA10A}">
-      <p15:sldGuideLst xmlns:p15="http://schemas.microsoft.com/office/powerpoint/2012/main">
+      <p15:sldGuideLst xmlns:p15="http://schemas.microsoft.com/office/powerpoint/2012/main" xmlns="">
         <p15:guide id="1" orient="horz" pos="1800" userDrawn="1">
           <p15:clr>
             <a:srgbClr val="A4A3A4"/>
@@ -125,7 +125,7 @@
       </p15:sldGuideLst>
     </p:ext>
     <p:ext uri="{2D200454-40CA-4A62-9FC3-DE9A4176ACB9}">
-      <p15:notesGuideLst xmlns:p15="http://schemas.microsoft.com/office/powerpoint/2012/main"/>
+      <p15:notesGuideLst xmlns:p15="http://schemas.microsoft.com/office/powerpoint/2012/main" xmlns=""/>
     </p:ext>
   </p:extLst>
 </p:presentation>
@@ -219,7 +219,7 @@
           <a:p>
             <a:fld id="{82AF1EC4-0AE9-4ABA-827F-84879B727577}" type="datetimeFigureOut">
               <a:rPr lang="en-US" smtClean="0"/>
-              <a:t>4/3/2016</a:t>
+              <a:t>4/4/2016</a:t>
             </a:fld>
             <a:endParaRPr lang="en-US"/>
           </a:p>
@@ -541,23 +541,7 @@
             </a:r>
             <a:r>
               <a:rPr lang="en-US" baseline="0" dirty="0" smtClean="0"/>
-              <a:t> module was used to automate testing.  Test suites have been developed for all of RADVs main modules.  The test cases currently cover 68% of </a:t>
-            </a:r>
-            <a:r>
-              <a:rPr lang="en-US" baseline="0" dirty="0" smtClean="0"/>
-              <a:t>lines </a:t>
-            </a:r>
-            <a:r>
-              <a:rPr lang="en-US" baseline="0" dirty="0" smtClean="0"/>
-              <a:t>of </a:t>
-            </a:r>
-            <a:r>
-              <a:rPr lang="en-US" baseline="0" dirty="0" smtClean="0"/>
-              <a:t>code.  </a:t>
-            </a:r>
-            <a:r>
-              <a:rPr lang="en-US" baseline="0" dirty="0" smtClean="0"/>
-              <a:t>We anticipate code coverage of approximately 85% in the final version of the tool.</a:t>
+              <a:t> module was used to automate testing.  Test suites have been developed for all of RADVs main modules.  The test cases currently cover 68% of lines of code.  We anticipate code coverage of approximately 85% in the final version of the tool.</a:t>
             </a:r>
             <a:endParaRPr lang="en-US" dirty="0"/>
           </a:p>
@@ -985,7 +969,7 @@
           <a:p>
             <a:fld id="{3EAEFB75-4DE4-4DFC-B956-52D01254B927}" type="datetimeFigureOut">
               <a:rPr lang="en-US" smtClean="0"/>
-              <a:t>4/3/2016</a:t>
+              <a:t>4/4/2016</a:t>
             </a:fld>
             <a:endParaRPr lang="en-US"/>
           </a:p>
@@ -1338,7 +1322,7 @@
           <a:p>
             <a:fld id="{3EAEFB75-4DE4-4DFC-B956-52D01254B927}" type="datetimeFigureOut">
               <a:rPr lang="en-US" smtClean="0"/>
-              <a:t>4/3/2016</a:t>
+              <a:t>4/4/2016</a:t>
             </a:fld>
             <a:endParaRPr lang="en-US"/>
           </a:p>
@@ -1513,7 +1497,7 @@
           <a:p>
             <a:fld id="{3EAEFB75-4DE4-4DFC-B956-52D01254B927}" type="datetimeFigureOut">
               <a:rPr lang="en-US" smtClean="0"/>
-              <a:t>4/3/2016</a:t>
+              <a:t>4/4/2016</a:t>
             </a:fld>
             <a:endParaRPr lang="en-US"/>
           </a:p>
@@ -1626,7 +1610,7 @@
           <a:p>
             <a:fld id="{3EAEFB75-4DE4-4DFC-B956-52D01254B927}" type="datetimeFigureOut">
               <a:rPr lang="en-US" smtClean="0"/>
-              <a:t>4/3/2016</a:t>
+              <a:t>4/4/2016</a:t>
             </a:fld>
             <a:endParaRPr lang="en-US"/>
           </a:p>
@@ -1984,7 +1968,7 @@
           <a:p>
             <a:fld id="{3EAEFB75-4DE4-4DFC-B956-52D01254B927}" type="datetimeFigureOut">
               <a:rPr lang="en-US" smtClean="0"/>
-              <a:t>4/3/2016</a:t>
+              <a:t>4/4/2016</a:t>
             </a:fld>
             <a:endParaRPr lang="en-US"/>
           </a:p>
@@ -2249,7 +2233,7 @@
           <a:p>
             <a:fld id="{3EAEFB75-4DE4-4DFC-B956-52D01254B927}" type="datetimeFigureOut">
               <a:rPr lang="en-US" smtClean="0"/>
-              <a:t>4/3/2016</a:t>
+              <a:t>4/4/2016</a:t>
             </a:fld>
             <a:endParaRPr lang="en-US"/>
           </a:p>
@@ -2611,7 +2595,7 @@
           <a:p>
             <a:fld id="{3EAEFB75-4DE4-4DFC-B956-52D01254B927}" type="datetimeFigureOut">
               <a:rPr lang="en-US" smtClean="0"/>
-              <a:t>4/3/2016</a:t>
+              <a:t>4/4/2016</a:t>
             </a:fld>
             <a:endParaRPr lang="en-US"/>
           </a:p>
@@ -2838,7 +2822,7 @@
           <a:p>
             <a:fld id="{3EAEFB75-4DE4-4DFC-B956-52D01254B927}" type="datetimeFigureOut">
               <a:rPr lang="en-US" smtClean="0"/>
-              <a:t>4/3/2016</a:t>
+              <a:t>4/4/2016</a:t>
             </a:fld>
             <a:endParaRPr lang="en-US"/>
           </a:p>
@@ -2928,7 +2912,7 @@
           <a:p>
             <a:fld id="{3EAEFB75-4DE4-4DFC-B956-52D01254B927}" type="datetimeFigureOut">
               <a:rPr lang="en-US" smtClean="0"/>
-              <a:t>4/3/2016</a:t>
+              <a:t>4/4/2016</a:t>
             </a:fld>
             <a:endParaRPr lang="en-US"/>
           </a:p>
@@ -3195,7 +3179,7 @@
           <a:p>
             <a:fld id="{3EAEFB75-4DE4-4DFC-B956-52D01254B927}" type="datetimeFigureOut">
               <a:rPr lang="en-US" smtClean="0"/>
-              <a:t>4/3/2016</a:t>
+              <a:t>4/4/2016</a:t>
             </a:fld>
             <a:endParaRPr lang="en-US"/>
           </a:p>
@@ -3423,7 +3407,7 @@
           <a:p>
             <a:fld id="{3EAEFB75-4DE4-4DFC-B956-52D01254B927}" type="datetimeFigureOut">
               <a:rPr lang="en-US" smtClean="0"/>
-              <a:t>4/3/2016</a:t>
+              <a:t>4/4/2016</a:t>
             </a:fld>
             <a:endParaRPr lang="en-US"/>
           </a:p>
@@ -3922,7 +3906,7 @@
           <a:p>
             <a:fld id="{3EAEFB75-4DE4-4DFC-B956-52D01254B927}" type="datetimeFigureOut">
               <a:rPr lang="en-US" smtClean="0"/>
-              <a:t>4/3/2016</a:t>
+              <a:t>4/4/2016</a:t>
             </a:fld>
             <a:endParaRPr lang="en-US"/>
           </a:p>
@@ -4335,7 +4319,7 @@
           <p:nvPr/>
         </p:nvPicPr>
         <p:blipFill>
-          <a:blip r:embed="rId3">
+          <a:blip r:embed="rId5">
             <a:extLst>
               <a:ext uri="{28A0092B-C50C-407E-A947-70E740481C1C}">
                 <a14:useLocalDpi xmlns:a14="http://schemas.microsoft.com/office/drawing/2010/main" val="0"/>
@@ -4405,6 +4389,39 @@
           </a:p>
         </p:txBody>
       </p:sp>
+      <p:pic>
+        <p:nvPicPr>
+          <p:cNvPr id="2" name="Slide #1.wav">
+            <a:hlinkClick r:id="" action="ppaction://media"/>
+          </p:cNvPr>
+          <p:cNvPicPr>
+            <a:picLocks noChangeAspect="1"/>
+          </p:cNvPicPr>
+          <p:nvPr>
+            <a:audioFile r:link="rId2"/>
+            <p:extLst>
+              <p:ext uri="{DAA4B4D4-6D71-4841-9C94-3DE7FCFB9230}">
+                <p14:media xmlns:p14="http://schemas.microsoft.com/office/powerpoint/2010/main" r:embed="rId1"/>
+              </p:ext>
+            </p:extLst>
+          </p:nvPr>
+        </p:nvPicPr>
+        <p:blipFill>
+          <a:blip r:embed="rId6"/>
+          <a:stretch>
+            <a:fillRect/>
+          </a:stretch>
+        </p:blipFill>
+        <p:spPr>
+          <a:xfrm>
+            <a:off x="9601200" y="4994476"/>
+            <a:ext cx="609600" cy="609600"/>
+          </a:xfrm>
+          <a:prstGeom prst="rect">
+            <a:avLst/>
+          </a:prstGeom>
+        </p:spPr>
+      </p:pic>
     </p:spTree>
     <p:extLst>
       <p:ext uri="{BB962C8B-B14F-4D97-AF65-F5344CB8AC3E}">
@@ -4415,13 +4432,109 @@
   <p:clrMapOvr>
     <a:masterClrMapping/>
   </p:clrMapOvr>
+  <mc:AlternateContent xmlns:mc="http://schemas.openxmlformats.org/markup-compatibility/2006">
+    <mc:Choice xmlns:p14="http://schemas.microsoft.com/office/powerpoint/2010/main" Requires="p14">
+      <p:transition spd="slow" p14:dur="2000" advTm="20537"/>
+    </mc:Choice>
+    <mc:Fallback>
+      <p:transition spd="slow" advTm="20537"/>
+    </mc:Fallback>
+  </mc:AlternateContent>
   <p:timing>
     <p:tnLst>
       <p:par>
-        <p:cTn id="1" dur="indefinite" restart="never" nodeType="tmRoot"/>
+        <p:cTn id="1" dur="indefinite" restart="never" nodeType="tmRoot">
+          <p:childTnLst>
+            <p:seq concurrent="1" nextAc="seek">
+              <p:cTn id="2" dur="indefinite" nodeType="mainSeq">
+                <p:childTnLst>
+                  <p:par>
+                    <p:cTn id="3" fill="hold">
+                      <p:stCondLst>
+                        <p:cond delay="indefinite"/>
+                        <p:cond evt="onBegin" delay="0">
+                          <p:tn val="2"/>
+                        </p:cond>
+                      </p:stCondLst>
+                      <p:childTnLst>
+                        <p:par>
+                          <p:cTn id="4" fill="hold">
+                            <p:stCondLst>
+                              <p:cond delay="0"/>
+                            </p:stCondLst>
+                            <p:childTnLst>
+                              <p:par>
+                                <p:cTn id="5" presetID="1" presetClass="mediacall" presetSubtype="0" fill="hold" nodeType="afterEffect">
+                                  <p:stCondLst>
+                                    <p:cond delay="0"/>
+                                  </p:stCondLst>
+                                  <p:childTnLst>
+                                    <p:cmd type="call" cmd="playFrom(0.0)">
+                                      <p:cBhvr>
+                                        <p:cTn id="6" dur="20665" fill="hold"/>
+                                        <p:tgtEl>
+                                          <p:spTgt spid="2"/>
+                                        </p:tgtEl>
+                                      </p:cBhvr>
+                                    </p:cmd>
+                                  </p:childTnLst>
+                                </p:cTn>
+                              </p:par>
+                            </p:childTnLst>
+                          </p:cTn>
+                        </p:par>
+                      </p:childTnLst>
+                    </p:cTn>
+                  </p:par>
+                </p:childTnLst>
+              </p:cTn>
+              <p:prevCondLst>
+                <p:cond evt="onPrev" delay="0">
+                  <p:tgtEl>
+                    <p:sldTgt/>
+                  </p:tgtEl>
+                </p:cond>
+              </p:prevCondLst>
+              <p:nextCondLst>
+                <p:cond evt="onNext" delay="0">
+                  <p:tgtEl>
+                    <p:sldTgt/>
+                  </p:tgtEl>
+                </p:cond>
+              </p:nextCondLst>
+            </p:seq>
+            <p:audio>
+              <p:cMediaNode vol="80000">
+                <p:cTn id="7" fill="hold" display="0">
+                  <p:stCondLst>
+                    <p:cond delay="indefinite"/>
+                  </p:stCondLst>
+                  <p:endCondLst>
+                    <p:cond evt="onStopAudio" delay="0">
+                      <p:tgtEl>
+                        <p:sldTgt/>
+                      </p:tgtEl>
+                    </p:cond>
+                  </p:endCondLst>
+                </p:cTn>
+                <p:tgtEl>
+                  <p:spTgt spid="2"/>
+                </p:tgtEl>
+              </p:cMediaNode>
+            </p:audio>
+          </p:childTnLst>
+        </p:cTn>
       </p:par>
     </p:tnLst>
   </p:timing>
+  <p:extLst>
+    <p:ext uri="{E180D4A7-C9FB-4DFB-919C-405C955672EB}">
+      <p14:showEvtLst xmlns:p14="http://schemas.microsoft.com/office/powerpoint/2010/main">
+        <p14:playEvt time="0" objId="2"/>
+        <p14:stopEvt time="20537" objId="2"/>
+      </p14:showEvtLst>
+    </p:ext>
+  </p:extLst>
 </p:sld>
 </file>
 
@@ -4529,6 +4642,39 @@
           </a:p>
         </p:txBody>
       </p:sp>
+      <p:pic>
+        <p:nvPicPr>
+          <p:cNvPr id="2" name="Slide #2.wav">
+            <a:hlinkClick r:id="" action="ppaction://media"/>
+          </p:cNvPr>
+          <p:cNvPicPr>
+            <a:picLocks noChangeAspect="1"/>
+          </p:cNvPicPr>
+          <p:nvPr>
+            <a:audioFile r:link="rId2"/>
+            <p:extLst>
+              <p:ext uri="{DAA4B4D4-6D71-4841-9C94-3DE7FCFB9230}">
+                <p14:media xmlns:p14="http://schemas.microsoft.com/office/powerpoint/2010/main" r:embed="rId1"/>
+              </p:ext>
+            </p:extLst>
+          </p:nvPr>
+        </p:nvPicPr>
+        <p:blipFill>
+          <a:blip r:embed="rId5"/>
+          <a:stretch>
+            <a:fillRect/>
+          </a:stretch>
+        </p:blipFill>
+        <p:spPr>
+          <a:xfrm>
+            <a:off x="9601200" y="5105400"/>
+            <a:ext cx="609600" cy="609600"/>
+          </a:xfrm>
+          <a:prstGeom prst="rect">
+            <a:avLst/>
+          </a:prstGeom>
+        </p:spPr>
+      </p:pic>
     </p:spTree>
     <p:extLst>
       <p:ext uri="{BB962C8B-B14F-4D97-AF65-F5344CB8AC3E}">
@@ -4539,21 +4685,109 @@
   <p:clrMapOvr>
     <a:masterClrMapping/>
   </p:clrMapOvr>
-  <mc:AlternateContent xmlns:mc="http://schemas.openxmlformats.org/markup-compatibility/2006" xmlns:p14="http://schemas.microsoft.com/office/powerpoint/2010/main">
-    <mc:Choice Requires="p14">
-      <p:transition p14:dur="250" advTm="14671"/>
+  <mc:AlternateContent xmlns:mc="http://schemas.openxmlformats.org/markup-compatibility/2006">
+    <mc:Choice xmlns:p14="http://schemas.microsoft.com/office/powerpoint/2010/main" Requires="p14">
+      <p:transition p14:dur="250" advTm="18917"/>
     </mc:Choice>
-    <mc:Fallback xmlns="">
-      <p:transition advTm="14671"/>
+    <mc:Fallback>
+      <p:transition advTm="18917"/>
     </mc:Fallback>
   </mc:AlternateContent>
   <p:timing>
     <p:tnLst>
       <p:par>
-        <p:cTn id="1" dur="indefinite" restart="never" nodeType="tmRoot"/>
+        <p:cTn id="1" dur="indefinite" restart="never" nodeType="tmRoot">
+          <p:childTnLst>
+            <p:seq concurrent="1" nextAc="seek">
+              <p:cTn id="2" dur="indefinite" nodeType="mainSeq">
+                <p:childTnLst>
+                  <p:par>
+                    <p:cTn id="3" fill="hold">
+                      <p:stCondLst>
+                        <p:cond delay="indefinite"/>
+                        <p:cond evt="onBegin" delay="0">
+                          <p:tn val="2"/>
+                        </p:cond>
+                      </p:stCondLst>
+                      <p:childTnLst>
+                        <p:par>
+                          <p:cTn id="4" fill="hold">
+                            <p:stCondLst>
+                              <p:cond delay="0"/>
+                            </p:stCondLst>
+                            <p:childTnLst>
+                              <p:par>
+                                <p:cTn id="5" presetID="1" presetClass="mediacall" presetSubtype="0" fill="hold" nodeType="afterEffect">
+                                  <p:stCondLst>
+                                    <p:cond delay="0"/>
+                                  </p:stCondLst>
+                                  <p:childTnLst>
+                                    <p:cmd type="call" cmd="playFrom(0.0)">
+                                      <p:cBhvr>
+                                        <p:cTn id="6" dur="19266" fill="hold"/>
+                                        <p:tgtEl>
+                                          <p:spTgt spid="2"/>
+                                        </p:tgtEl>
+                                      </p:cBhvr>
+                                    </p:cmd>
+                                  </p:childTnLst>
+                                </p:cTn>
+                              </p:par>
+                            </p:childTnLst>
+                          </p:cTn>
+                        </p:par>
+                      </p:childTnLst>
+                    </p:cTn>
+                  </p:par>
+                </p:childTnLst>
+              </p:cTn>
+              <p:prevCondLst>
+                <p:cond evt="onPrev" delay="0">
+                  <p:tgtEl>
+                    <p:sldTgt/>
+                  </p:tgtEl>
+                </p:cond>
+              </p:prevCondLst>
+              <p:nextCondLst>
+                <p:cond evt="onNext" delay="0">
+                  <p:tgtEl>
+                    <p:sldTgt/>
+                  </p:tgtEl>
+                </p:cond>
+              </p:nextCondLst>
+            </p:seq>
+            <p:audio>
+              <p:cMediaNode vol="80000">
+                <p:cTn id="7" fill="hold" display="0">
+                  <p:stCondLst>
+                    <p:cond delay="indefinite"/>
+                  </p:stCondLst>
+                  <p:endCondLst>
+                    <p:cond evt="onStopAudio" delay="0">
+                      <p:tgtEl>
+                        <p:sldTgt/>
+                      </p:tgtEl>
+                    </p:cond>
+                  </p:endCondLst>
+                </p:cTn>
+                <p:tgtEl>
+                  <p:spTgt spid="2"/>
+                </p:tgtEl>
+              </p:cMediaNode>
+            </p:audio>
+          </p:childTnLst>
+        </p:cTn>
       </p:par>
     </p:tnLst>
   </p:timing>
+  <p:extLst>
+    <p:ext uri="{E180D4A7-C9FB-4DFB-919C-405C955672EB}">
+      <p14:showEvtLst xmlns:p14="http://schemas.microsoft.com/office/powerpoint/2010/main">
+        <p14:playEvt time="0" objId="2"/>
+        <p14:stopEvt time="18917" objId="2"/>
+      </p14:showEvtLst>
+    </p:ext>
+  </p:extLst>
 </p:sld>
 </file>
 
@@ -4623,26 +4857,26 @@
           <a:p>
             <a:pPr lvl="1"/>
             <a:endParaRPr lang="en-US" sz="1600" dirty="0" smtClean="0">
-              <a:hlinkClick r:id="rId3"/>
+              <a:hlinkClick r:id="rId5"/>
             </a:endParaRPr>
           </a:p>
           <a:p>
             <a:pPr lvl="1"/>
             <a:r>
               <a:rPr lang="en-US" dirty="0" smtClean="0">
-                <a:hlinkClick r:id="rId3"/>
+                <a:hlinkClick r:id="rId5"/>
               </a:rPr>
               <a:t>https</a:t>
             </a:r>
             <a:r>
               <a:rPr lang="en-US" dirty="0">
-                <a:hlinkClick r:id="rId3"/>
+                <a:hlinkClick r:id="rId5"/>
               </a:rPr>
               <a:t>://</a:t>
             </a:r>
             <a:r>
               <a:rPr lang="en-US" dirty="0" smtClean="0">
-                <a:hlinkClick r:id="rId3"/>
+                <a:hlinkClick r:id="rId5"/>
               </a:rPr>
               <a:t>focus-appliance-122323.appspot.com/login</a:t>
             </a:r>
@@ -4680,6 +4914,39 @@
           </a:p>
         </p:txBody>
       </p:sp>
+      <p:pic>
+        <p:nvPicPr>
+          <p:cNvPr id="4" name="Slide #3.wav">
+            <a:hlinkClick r:id="" action="ppaction://media"/>
+          </p:cNvPr>
+          <p:cNvPicPr>
+            <a:picLocks noChangeAspect="1"/>
+          </p:cNvPicPr>
+          <p:nvPr>
+            <a:audioFile r:link="rId2"/>
+            <p:extLst>
+              <p:ext uri="{DAA4B4D4-6D71-4841-9C94-3DE7FCFB9230}">
+                <p14:media xmlns:p14="http://schemas.microsoft.com/office/powerpoint/2010/main" r:embed="rId1"/>
+              </p:ext>
+            </p:extLst>
+          </p:nvPr>
+        </p:nvPicPr>
+        <p:blipFill>
+          <a:blip r:embed="rId6"/>
+          <a:stretch>
+            <a:fillRect/>
+          </a:stretch>
+        </p:blipFill>
+        <p:spPr>
+          <a:xfrm>
+            <a:off x="9601200" y="5105400"/>
+            <a:ext cx="609600" cy="609600"/>
+          </a:xfrm>
+          <a:prstGeom prst="rect">
+            <a:avLst/>
+          </a:prstGeom>
+        </p:spPr>
+      </p:pic>
     </p:spTree>
     <p:extLst>
       <p:ext uri="{BB962C8B-B14F-4D97-AF65-F5344CB8AC3E}">
@@ -4690,21 +4957,109 @@
   <p:clrMapOvr>
     <a:masterClrMapping/>
   </p:clrMapOvr>
-  <mc:AlternateContent xmlns:mc="http://schemas.openxmlformats.org/markup-compatibility/2006" xmlns:p14="http://schemas.microsoft.com/office/powerpoint/2010/main">
-    <mc:Choice Requires="p14">
-      <p:transition p14:dur="250"/>
+  <mc:AlternateContent xmlns:mc="http://schemas.openxmlformats.org/markup-compatibility/2006">
+    <mc:Choice xmlns:p14="http://schemas.microsoft.com/office/powerpoint/2010/main" Requires="p14">
+      <p:transition p14:dur="250" advTm="8358"/>
     </mc:Choice>
-    <mc:Fallback xmlns="">
-      <p:transition/>
+    <mc:Fallback>
+      <p:transition advTm="8358"/>
     </mc:Fallback>
   </mc:AlternateContent>
   <p:timing>
     <p:tnLst>
       <p:par>
-        <p:cTn id="1" dur="indefinite" restart="never" nodeType="tmRoot"/>
+        <p:cTn id="1" dur="indefinite" restart="never" nodeType="tmRoot">
+          <p:childTnLst>
+            <p:seq concurrent="1" nextAc="seek">
+              <p:cTn id="2" dur="indefinite" nodeType="mainSeq">
+                <p:childTnLst>
+                  <p:par>
+                    <p:cTn id="3" fill="hold">
+                      <p:stCondLst>
+                        <p:cond delay="indefinite"/>
+                        <p:cond evt="onBegin" delay="0">
+                          <p:tn val="2"/>
+                        </p:cond>
+                      </p:stCondLst>
+                      <p:childTnLst>
+                        <p:par>
+                          <p:cTn id="4" fill="hold">
+                            <p:stCondLst>
+                              <p:cond delay="0"/>
+                            </p:stCondLst>
+                            <p:childTnLst>
+                              <p:par>
+                                <p:cTn id="5" presetID="1" presetClass="mediacall" presetSubtype="0" fill="hold" nodeType="afterEffect">
+                                  <p:stCondLst>
+                                    <p:cond delay="0"/>
+                                  </p:stCondLst>
+                                  <p:childTnLst>
+                                    <p:cmd type="call" cmd="playFrom(0.0)">
+                                      <p:cBhvr>
+                                        <p:cTn id="6" dur="7946" fill="hold"/>
+                                        <p:tgtEl>
+                                          <p:spTgt spid="4"/>
+                                        </p:tgtEl>
+                                      </p:cBhvr>
+                                    </p:cmd>
+                                  </p:childTnLst>
+                                </p:cTn>
+                              </p:par>
+                            </p:childTnLst>
+                          </p:cTn>
+                        </p:par>
+                      </p:childTnLst>
+                    </p:cTn>
+                  </p:par>
+                </p:childTnLst>
+              </p:cTn>
+              <p:prevCondLst>
+                <p:cond evt="onPrev" delay="0">
+                  <p:tgtEl>
+                    <p:sldTgt/>
+                  </p:tgtEl>
+                </p:cond>
+              </p:prevCondLst>
+              <p:nextCondLst>
+                <p:cond evt="onNext" delay="0">
+                  <p:tgtEl>
+                    <p:sldTgt/>
+                  </p:tgtEl>
+                </p:cond>
+              </p:nextCondLst>
+            </p:seq>
+            <p:audio>
+              <p:cMediaNode vol="80000">
+                <p:cTn id="7" fill="hold" display="0">
+                  <p:stCondLst>
+                    <p:cond delay="indefinite"/>
+                  </p:stCondLst>
+                  <p:endCondLst>
+                    <p:cond evt="onStopAudio" delay="0">
+                      <p:tgtEl>
+                        <p:sldTgt/>
+                      </p:tgtEl>
+                    </p:cond>
+                  </p:endCondLst>
+                </p:cTn>
+                <p:tgtEl>
+                  <p:spTgt spid="4"/>
+                </p:tgtEl>
+              </p:cMediaNode>
+            </p:audio>
+          </p:childTnLst>
+        </p:cTn>
       </p:par>
     </p:tnLst>
   </p:timing>
+  <p:extLst>
+    <p:ext uri="{E180D4A7-C9FB-4DFB-919C-405C955672EB}">
+      <p14:showEvtLst xmlns:p14="http://schemas.microsoft.com/office/powerpoint/2010/main">
+        <p14:playEvt time="0" objId="4"/>
+        <p14:stopEvt time="8107" objId="4"/>
+      </p14:showEvtLst>
+    </p:ext>
+  </p:extLst>
 </p:sld>
 </file>
 
@@ -5235,7 +5590,7 @@
   <a:extraClrSchemeLst/>
   <a:extLst>
     <a:ext uri="{05A4C25C-085E-4340-85A3-A5531E510DB2}">
-      <thm15:themeFamily xmlns:thm15="http://schemas.microsoft.com/office/thememl/2012/main" name="Office Theme" id="{62F939B6-93AF-4DB8-9C6B-D6C7DFDC589F}" vid="{4A3C46E8-61CC-4603-A589-7422A47A8E4A}"/>
+      <thm15:themeFamily xmlns:thm15="http://schemas.microsoft.com/office/thememl/2012/main" xmlns="" name="Office Theme" id="{62F939B6-93AF-4DB8-9C6B-D6C7DFDC589F}" vid="{4A3C46E8-61CC-4603-A589-7422A47A8E4A}"/>
     </a:ext>
   </a:extLst>
 </a:theme>

</xml_diff>